<commit_message>
Final touches to the presentation
</commit_message>
<xml_diff>
--- a/documentation/Presentation.pptx
+++ b/documentation/Presentation.pptx
@@ -7985,7 +7985,7 @@
         </p:blipFill>
         <p:spPr>
           <a:xfrm>
-            <a:off x="8104201" y="3210756"/>
+            <a:off x="6096000" y="3276599"/>
             <a:ext cx="1658275" cy="1573567"/>
           </a:xfrm>
           <a:prstGeom prst="rect">
@@ -8069,7 +8069,7 @@
         </p:blipFill>
         <p:spPr bwMode="auto">
           <a:xfrm>
-            <a:off x="4493579" y="3355758"/>
+            <a:off x="3413278" y="3355757"/>
             <a:ext cx="1428565" cy="1428565"/>
           </a:xfrm>
           <a:prstGeom prst="rect">
@@ -8132,6 +8132,36 @@
               </a14:hiddenFill>
             </a:ext>
           </a:extLst>
+        </p:spPr>
+      </p:pic>
+      <p:pic>
+        <p:nvPicPr>
+          <p:cNvPr id="2" name="Картина 1">
+            <a:extLst>
+              <a:ext uri="{FF2B5EF4-FFF2-40B4-BE49-F238E27FC236}">
+                <a16:creationId xmlns:a16="http://schemas.microsoft.com/office/drawing/2014/main" id="{A838C459-9F8E-6701-4714-F35AF69A0124}"/>
+              </a:ext>
+            </a:extLst>
+          </p:cNvPr>
+          <p:cNvPicPr>
+            <a:picLocks noChangeAspect="1"/>
+          </p:cNvPicPr>
+          <p:nvPr/>
+        </p:nvPicPr>
+        <p:blipFill>
+          <a:blip r:embed="rId8"/>
+          <a:stretch>
+            <a:fillRect/>
+          </a:stretch>
+        </p:blipFill>
+        <p:spPr>
+          <a:xfrm>
+            <a:off x="9008432" y="3421602"/>
+            <a:ext cx="1428564" cy="1428564"/>
+          </a:xfrm>
+          <a:prstGeom prst="rect">
+            <a:avLst/>
+          </a:prstGeom>
         </p:spPr>
       </p:pic>
     </p:spTree>

</xml_diff>